<commit_message>
Auto push 2023-03-18 18:08:09.42
</commit_message>
<xml_diff>
--- a/note/08_1stProject/0317_sample.pptx
+++ b/note/08_1stProject/0317_sample.pptx
@@ -253,7 +253,7 @@
           <a:p>
             <a:fld id="{684ABEAC-FD1E-446D-854E-09142DFB339C}" type="datetimeFigureOut">
               <a:rPr lang="ko-KR" altLang="en-US" smtClean="0"/>
-              <a:t>2023-03-16</a:t>
+              <a:t>2023-03-17</a:t>
             </a:fld>
             <a:endParaRPr lang="ko-KR" altLang="en-US"/>
           </a:p>
@@ -418,7 +418,7 @@
           <a:p>
             <a:fld id="{E299D967-67B2-4132-B52D-A253871A1F24}" type="datetimeFigureOut">
               <a:rPr lang="ko-KR" altLang="en-US" smtClean="0"/>
-              <a:t>2023-03-16</a:t>
+              <a:t>2023-03-17</a:t>
             </a:fld>
             <a:endParaRPr lang="ko-KR" altLang="en-US"/>
           </a:p>
@@ -1128,7 +1128,7 @@
           <a:p>
             <a:fld id="{20303F18-CB98-4E85-A37B-EF5A4E6C8DE7}" type="datetime1">
               <a:rPr lang="ko-KR" altLang="en-US" smtClean="0"/>
-              <a:t>2023-03-16</a:t>
+              <a:t>2023-03-17</a:t>
             </a:fld>
             <a:endParaRPr lang="ko-KR" altLang="en-US"/>
           </a:p>
@@ -1301,7 +1301,7 @@
           <a:p>
             <a:fld id="{CCA16C65-58A5-46D5-A762-12670B92641B}" type="datetime1">
               <a:rPr lang="ko-KR" altLang="en-US" smtClean="0"/>
-              <a:t>2023-03-16</a:t>
+              <a:t>2023-03-17</a:t>
             </a:fld>
             <a:endParaRPr lang="ko-KR" altLang="en-US"/>
           </a:p>
@@ -1479,7 +1479,7 @@
           <a:p>
             <a:fld id="{2D09A68A-AC6E-41FE-B28C-2BB812CC2E01}" type="datetime1">
               <a:rPr lang="ko-KR" altLang="en-US" smtClean="0"/>
-              <a:t>2023-03-16</a:t>
+              <a:t>2023-03-17</a:t>
             </a:fld>
             <a:endParaRPr lang="ko-KR" altLang="en-US"/>
           </a:p>
@@ -1647,7 +1647,7 @@
           <a:p>
             <a:fld id="{690B8B09-A0F3-4880-B090-7FDDEE5B5065}" type="datetime1">
               <a:rPr lang="ko-KR" altLang="en-US" smtClean="0"/>
-              <a:t>2023-03-16</a:t>
+              <a:t>2023-03-17</a:t>
             </a:fld>
             <a:endParaRPr lang="ko-KR" altLang="en-US"/>
           </a:p>
@@ -1892,7 +1892,7 @@
           <a:p>
             <a:fld id="{82F7D3F4-816B-4FA6-91FC-91836ECD0E53}" type="datetime1">
               <a:rPr lang="ko-KR" altLang="en-US" smtClean="0"/>
-              <a:t>2023-03-16</a:t>
+              <a:t>2023-03-17</a:t>
             </a:fld>
             <a:endParaRPr lang="ko-KR" altLang="en-US"/>
           </a:p>
@@ -2177,7 +2177,7 @@
           <a:p>
             <a:fld id="{2FB9FCFF-984A-4549-AB53-391F9EC1244A}" type="datetime1">
               <a:rPr lang="ko-KR" altLang="en-US" smtClean="0"/>
-              <a:t>2023-03-16</a:t>
+              <a:t>2023-03-17</a:t>
             </a:fld>
             <a:endParaRPr lang="ko-KR" altLang="en-US"/>
           </a:p>
@@ -2596,7 +2596,7 @@
           <a:p>
             <a:fld id="{94618DE4-C4FE-4171-90C7-38CF01638033}" type="datetime1">
               <a:rPr lang="ko-KR" altLang="en-US" smtClean="0"/>
-              <a:t>2023-03-16</a:t>
+              <a:t>2023-03-17</a:t>
             </a:fld>
             <a:endParaRPr lang="ko-KR" altLang="en-US"/>
           </a:p>
@@ -2713,7 +2713,7 @@
           <a:p>
             <a:fld id="{33587621-9D18-4C20-9B84-3E938621A025}" type="datetime1">
               <a:rPr lang="ko-KR" altLang="en-US" smtClean="0"/>
-              <a:t>2023-03-16</a:t>
+              <a:t>2023-03-17</a:t>
             </a:fld>
             <a:endParaRPr lang="ko-KR" altLang="en-US"/>
           </a:p>
@@ -3397,7 +3397,7 @@
           <a:p>
             <a:fld id="{B517649B-2577-404C-858E-51E9DEBB2548}" type="datetime1">
               <a:rPr lang="ko-KR" altLang="en-US" smtClean="0"/>
-              <a:t>2023-03-16</a:t>
+              <a:t>2023-03-17</a:t>
             </a:fld>
             <a:endParaRPr lang="ko-KR" altLang="en-US"/>
           </a:p>
@@ -3649,7 +3649,7 @@
           <a:p>
             <a:fld id="{8D84C674-EF46-4F27-9E3E-4F6A170B0DC6}" type="datetime1">
               <a:rPr lang="ko-KR" altLang="en-US" smtClean="0"/>
-              <a:t>2023-03-16</a:t>
+              <a:t>2023-03-17</a:t>
             </a:fld>
             <a:endParaRPr lang="ko-KR" altLang="en-US"/>
           </a:p>
@@ -3860,7 +3860,7 @@
           <a:p>
             <a:fld id="{B40F11ED-9D7B-4CCE-A57D-CC1D7760FB25}" type="datetime1">
               <a:rPr lang="ko-KR" altLang="en-US" smtClean="0"/>
-              <a:t>2023-03-16</a:t>
+              <a:t>2023-03-17</a:t>
             </a:fld>
             <a:endParaRPr lang="ko-KR" altLang="en-US"/>
           </a:p>
@@ -4918,7 +4918,7 @@
               <a:buChar char="-"/>
             </a:pPr>
             <a:r>
-              <a:rPr lang="ko-KR" altLang="en-US" sz="1600" smtClean="0">
+              <a:rPr lang="ko-KR" altLang="en-US" sz="1600" dirty="0" smtClean="0">
                 <a:solidFill>
                   <a:srgbClr val="464646"/>
                 </a:solidFill>
@@ -4928,7 +4928,7 @@
               <a:t>로그인 후 내 서재 메뉴를 통해</a:t>
             </a:r>
             <a:r>
-              <a:rPr lang="en-US" altLang="ko-KR" sz="1600" smtClean="0">
+              <a:rPr lang="en-US" altLang="ko-KR" sz="1600" dirty="0" smtClean="0">
                 <a:solidFill>
                   <a:srgbClr val="464646"/>
                 </a:solidFill>
@@ -4938,7 +4938,7 @@
               <a:t>, </a:t>
             </a:r>
             <a:r>
-              <a:rPr lang="ko-KR" altLang="en-US" sz="1600" smtClean="0">
+              <a:rPr lang="ko-KR" altLang="en-US" sz="1600" dirty="0" smtClean="0">
                 <a:solidFill>
                   <a:srgbClr val="464646"/>
                 </a:solidFill>
@@ -4948,7 +4948,7 @@
               <a:t>회원정보 수정</a:t>
             </a:r>
             <a:r>
-              <a:rPr lang="en-US" altLang="ko-KR" sz="1600" smtClean="0">
+              <a:rPr lang="en-US" altLang="ko-KR" sz="1600" dirty="0" smtClean="0">
                 <a:solidFill>
                   <a:srgbClr val="464646"/>
                 </a:solidFill>
@@ -4958,7 +4958,7 @@
               <a:t>, </a:t>
             </a:r>
             <a:r>
-              <a:rPr lang="ko-KR" altLang="en-US" sz="1600" smtClean="0">
+              <a:rPr lang="ko-KR" altLang="en-US" sz="1600" dirty="0" smtClean="0">
                 <a:solidFill>
                   <a:srgbClr val="464646"/>
                 </a:solidFill>
@@ -5008,17 +5008,27 @@
               <a:t>, </a:t>
             </a:r>
             <a:r>
-              <a:rPr lang="ko-KR" altLang="en-US" sz="1600">
+              <a:rPr lang="ko-KR" altLang="en-US" sz="1600" dirty="0" err="1">
                 <a:solidFill>
                   <a:srgbClr val="464646"/>
                 </a:solidFill>
                 <a:latin typeface="한컴 윤고딕 230" panose="02020603020101020101" pitchFamily="18" charset="-127"/>
                 <a:ea typeface="한컴 윤고딕 230" panose="02020603020101020101" pitchFamily="18" charset="-127"/>
               </a:rPr>
-              <a:t>자리예약 </a:t>
-            </a:r>
-            <a:r>
-              <a:rPr lang="ko-KR" altLang="en-US" sz="1600" smtClean="0">
+              <a:t>자리예약</a:t>
+            </a:r>
+            <a:r>
+              <a:rPr lang="ko-KR" altLang="en-US" sz="1600" dirty="0">
+                <a:solidFill>
+                  <a:srgbClr val="464646"/>
+                </a:solidFill>
+                <a:latin typeface="한컴 윤고딕 230" panose="02020603020101020101" pitchFamily="18" charset="-127"/>
+                <a:ea typeface="한컴 윤고딕 230" panose="02020603020101020101" pitchFamily="18" charset="-127"/>
+              </a:rPr>
+              <a:t> </a:t>
+            </a:r>
+            <a:r>
+              <a:rPr lang="ko-KR" altLang="en-US" sz="1600" dirty="0" smtClean="0">
                 <a:solidFill>
                   <a:srgbClr val="464646"/>
                 </a:solidFill>
@@ -5028,7 +5038,7 @@
               <a:t>확인할 수 있다</a:t>
             </a:r>
             <a:r>
-              <a:rPr lang="en-US" altLang="ko-KR" sz="1600" smtClean="0">
+              <a:rPr lang="en-US" altLang="ko-KR" sz="1600" dirty="0" smtClean="0">
                 <a:solidFill>
                   <a:srgbClr val="464646"/>
                 </a:solidFill>
@@ -5548,7 +5558,7 @@
         </p:blipFill>
         <p:spPr>
           <a:xfrm>
-            <a:off x="3923928" y="4299942"/>
+            <a:off x="4492275" y="4227934"/>
             <a:ext cx="323850" cy="121444"/>
           </a:xfrm>
           <a:prstGeom prst="rect">
@@ -6116,7 +6126,7 @@
             <a:p>
               <a:pPr algn="ctr"/>
               <a:r>
-                <a:rPr lang="ko-KR" altLang="en-US" sz="1600" b="1">
+                <a:rPr lang="ko-KR" altLang="en-US" sz="1600" b="1" dirty="0">
                   <a:solidFill>
                     <a:schemeClr val="bg1"/>
                   </a:solidFill>
@@ -6172,7 +6182,7 @@
             <a:p>
               <a:pPr algn="ctr"/>
               <a:r>
-                <a:rPr lang="ko-KR" altLang="en-US" sz="1600" b="1">
+                <a:rPr lang="ko-KR" altLang="en-US" sz="1600" b="1" dirty="0">
                   <a:solidFill>
                     <a:schemeClr val="bg1"/>
                   </a:solidFill>
@@ -17206,7 +17216,7 @@
         </p:blipFill>
         <p:spPr bwMode="auto">
           <a:xfrm>
-            <a:off x="251520" y="411510"/>
+            <a:off x="317478" y="411510"/>
             <a:ext cx="8496944" cy="4260124"/>
           </a:xfrm>
           <a:prstGeom prst="rect">
@@ -31004,16 +31014,7 @@
                 </a:solidFill>
                 <a:latin typeface="+mn-ea"/>
               </a:rPr>
-              <a:t>(</a:t>
-            </a:r>
-            <a:r>
-              <a:rPr lang="en-US" altLang="ko-KR" sz="1000" b="1">
-                <a:solidFill>
-                  <a:schemeClr val="bg1"/>
-                </a:solidFill>
-                <a:latin typeface="+mn-ea"/>
-              </a:rPr>
-              <a:t>ERD</a:t>
+              <a:t>(ERD</a:t>
             </a:r>
             <a:r>
               <a:rPr lang="en-US" altLang="ko-KR" sz="1000" b="1" smtClean="0">
@@ -35716,7 +35717,7 @@
         </p:blipFill>
         <p:spPr>
           <a:xfrm>
-            <a:off x="2051723" y="1505086"/>
+            <a:off x="1907704" y="1521242"/>
             <a:ext cx="4729449" cy="2150858"/>
           </a:xfrm>
           <a:prstGeom prst="rect">
@@ -36129,7 +36130,7 @@
                 <a:defRPr/>
               </a:pPr>
               <a:r>
-                <a:rPr kumimoji="0" lang="en-US" altLang="ko-KR" sz="1200">
+                <a:rPr kumimoji="0" lang="en-US" altLang="ko-KR" sz="1200" dirty="0">
                   <a:solidFill>
                     <a:srgbClr val="3F3F48"/>
                   </a:solidFill>
@@ -36138,7 +36139,7 @@
                 <a:t>Windows </a:t>
               </a:r>
               <a:r>
-                <a:rPr kumimoji="0" lang="en-US" altLang="ko-KR" sz="1200" smtClean="0">
+                <a:rPr kumimoji="0" lang="en-US" altLang="ko-KR" sz="1200" dirty="0" smtClean="0">
                   <a:solidFill>
                     <a:srgbClr val="3F3F48"/>
                   </a:solidFill>
@@ -36147,7 +36148,7 @@
                 <a:t>10 </a:t>
               </a:r>
               <a:r>
-                <a:rPr lang="en-US" altLang="ko-KR" sz="1200" smtClean="0">
+                <a:rPr lang="en-US" altLang="ko-KR" sz="1200" dirty="0" smtClean="0">
                   <a:solidFill>
                     <a:srgbClr val="3F3F48"/>
                   </a:solidFill>
@@ -37856,23 +37857,8 @@
                   </a:solidFill>
                   <a:latin typeface="+mn-ea"/>
                 </a:rPr>
-                <a:t>MVC model </a:t>
+                <a:t>MVC model (model 2)</a:t>
               </a:r>
-              <a:r>
-                <a:rPr kumimoji="0" lang="en-US" altLang="ko-KR" sz="1200">
-                  <a:solidFill>
-                    <a:srgbClr val="3F3F48"/>
-                  </a:solidFill>
-                  <a:latin typeface="+mn-ea"/>
-                </a:rPr>
-                <a:t>(model 2)</a:t>
-              </a:r>
-              <a:endParaRPr kumimoji="0" lang="en-US" altLang="ko-KR" sz="1200" dirty="0">
-                <a:solidFill>
-                  <a:srgbClr val="3F3F48"/>
-                </a:solidFill>
-                <a:latin typeface="+mn-ea"/>
-              </a:endParaRPr>
             </a:p>
           </p:txBody>
         </p:sp>
@@ -38077,16 +38063,7 @@
                   </a:solidFill>
                   <a:latin typeface="+mn-ea"/>
                 </a:rPr>
-                <a:t> </a:t>
-              </a:r>
-              <a:r>
-                <a:rPr lang="en-US" altLang="ko-KR" sz="1200" smtClean="0">
-                  <a:solidFill>
-                    <a:srgbClr val="3F3F48"/>
-                  </a:solidFill>
-                  <a:latin typeface="+mn-ea"/>
-                </a:rPr>
-                <a:t>cos-26Dec2008, React,</a:t>
+                <a:t> cos-26Dec2008, React,</a:t>
               </a:r>
               <a:endParaRPr kumimoji="0" lang="en-US" altLang="ko-KR" sz="1200" dirty="0">
                 <a:solidFill>

</xml_diff>

<commit_message>
Auto push 2023-04-03  0:18:19.72
</commit_message>
<xml_diff>
--- a/note/08_1stProject/0317_sample.pptx
+++ b/note/08_1stProject/0317_sample.pptx
@@ -253,7 +253,7 @@
           <a:p>
             <a:fld id="{684ABEAC-FD1E-446D-854E-09142DFB339C}" type="datetimeFigureOut">
               <a:rPr lang="ko-KR" altLang="en-US" smtClean="0"/>
-              <a:t>2023-03-17</a:t>
+              <a:t>2023-04-01</a:t>
             </a:fld>
             <a:endParaRPr lang="ko-KR" altLang="en-US"/>
           </a:p>
@@ -418,7 +418,7 @@
           <a:p>
             <a:fld id="{E299D967-67B2-4132-B52D-A253871A1F24}" type="datetimeFigureOut">
               <a:rPr lang="ko-KR" altLang="en-US" smtClean="0"/>
-              <a:t>2023-03-17</a:t>
+              <a:t>2023-04-01</a:t>
             </a:fld>
             <a:endParaRPr lang="ko-KR" altLang="en-US"/>
           </a:p>
@@ -1128,7 +1128,7 @@
           <a:p>
             <a:fld id="{20303F18-CB98-4E85-A37B-EF5A4E6C8DE7}" type="datetime1">
               <a:rPr lang="ko-KR" altLang="en-US" smtClean="0"/>
-              <a:t>2023-03-17</a:t>
+              <a:t>2023-04-01</a:t>
             </a:fld>
             <a:endParaRPr lang="ko-KR" altLang="en-US"/>
           </a:p>
@@ -1301,7 +1301,7 @@
           <a:p>
             <a:fld id="{CCA16C65-58A5-46D5-A762-12670B92641B}" type="datetime1">
               <a:rPr lang="ko-KR" altLang="en-US" smtClean="0"/>
-              <a:t>2023-03-17</a:t>
+              <a:t>2023-04-01</a:t>
             </a:fld>
             <a:endParaRPr lang="ko-KR" altLang="en-US"/>
           </a:p>
@@ -1479,7 +1479,7 @@
           <a:p>
             <a:fld id="{2D09A68A-AC6E-41FE-B28C-2BB812CC2E01}" type="datetime1">
               <a:rPr lang="ko-KR" altLang="en-US" smtClean="0"/>
-              <a:t>2023-03-17</a:t>
+              <a:t>2023-04-01</a:t>
             </a:fld>
             <a:endParaRPr lang="ko-KR" altLang="en-US"/>
           </a:p>
@@ -1647,7 +1647,7 @@
           <a:p>
             <a:fld id="{690B8B09-A0F3-4880-B090-7FDDEE5B5065}" type="datetime1">
               <a:rPr lang="ko-KR" altLang="en-US" smtClean="0"/>
-              <a:t>2023-03-17</a:t>
+              <a:t>2023-04-01</a:t>
             </a:fld>
             <a:endParaRPr lang="ko-KR" altLang="en-US"/>
           </a:p>
@@ -1892,7 +1892,7 @@
           <a:p>
             <a:fld id="{82F7D3F4-816B-4FA6-91FC-91836ECD0E53}" type="datetime1">
               <a:rPr lang="ko-KR" altLang="en-US" smtClean="0"/>
-              <a:t>2023-03-17</a:t>
+              <a:t>2023-04-01</a:t>
             </a:fld>
             <a:endParaRPr lang="ko-KR" altLang="en-US"/>
           </a:p>
@@ -2177,7 +2177,7 @@
           <a:p>
             <a:fld id="{2FB9FCFF-984A-4549-AB53-391F9EC1244A}" type="datetime1">
               <a:rPr lang="ko-KR" altLang="en-US" smtClean="0"/>
-              <a:t>2023-03-17</a:t>
+              <a:t>2023-04-01</a:t>
             </a:fld>
             <a:endParaRPr lang="ko-KR" altLang="en-US"/>
           </a:p>
@@ -2596,7 +2596,7 @@
           <a:p>
             <a:fld id="{94618DE4-C4FE-4171-90C7-38CF01638033}" type="datetime1">
               <a:rPr lang="ko-KR" altLang="en-US" smtClean="0"/>
-              <a:t>2023-03-17</a:t>
+              <a:t>2023-04-01</a:t>
             </a:fld>
             <a:endParaRPr lang="ko-KR" altLang="en-US"/>
           </a:p>
@@ -2713,7 +2713,7 @@
           <a:p>
             <a:fld id="{33587621-9D18-4C20-9B84-3E938621A025}" type="datetime1">
               <a:rPr lang="ko-KR" altLang="en-US" smtClean="0"/>
-              <a:t>2023-03-17</a:t>
+              <a:t>2023-04-01</a:t>
             </a:fld>
             <a:endParaRPr lang="ko-KR" altLang="en-US"/>
           </a:p>
@@ -3397,7 +3397,7 @@
           <a:p>
             <a:fld id="{B517649B-2577-404C-858E-51E9DEBB2548}" type="datetime1">
               <a:rPr lang="ko-KR" altLang="en-US" smtClean="0"/>
-              <a:t>2023-03-17</a:t>
+              <a:t>2023-04-01</a:t>
             </a:fld>
             <a:endParaRPr lang="ko-KR" altLang="en-US"/>
           </a:p>
@@ -3649,7 +3649,7 @@
           <a:p>
             <a:fld id="{8D84C674-EF46-4F27-9E3E-4F6A170B0DC6}" type="datetime1">
               <a:rPr lang="ko-KR" altLang="en-US" smtClean="0"/>
-              <a:t>2023-03-17</a:t>
+              <a:t>2023-04-01</a:t>
             </a:fld>
             <a:endParaRPr lang="ko-KR" altLang="en-US"/>
           </a:p>
@@ -3860,7 +3860,7 @@
           <a:p>
             <a:fld id="{B40F11ED-9D7B-4CCE-A57D-CC1D7760FB25}" type="datetime1">
               <a:rPr lang="ko-KR" altLang="en-US" smtClean="0"/>
-              <a:t>2023-03-17</a:t>
+              <a:t>2023-04-01</a:t>
             </a:fld>
             <a:endParaRPr lang="ko-KR" altLang="en-US"/>
           </a:p>

</xml_diff>